<commit_message>
Added a little bit to future works
</commit_message>
<xml_diff>
--- a/presentation/NN_FINAL.pptx
+++ b/presentation/NN_FINAL.pptx
@@ -143,10 +143,6 @@
     </p:ext>
   </p:extLst>
 </p:presentation>
-</file>
-
-<file path=ppt/revisionInfo.xml><?xml version="1.0" encoding="utf-8"?>
-<p1510:revInfo xmlns:a="http://schemas.openxmlformats.org/drawingml/2006/main" xmlns:r="http://schemas.openxmlformats.org/officeDocument/2006/relationships" xmlns:p1510="http://schemas.microsoft.com/office/powerpoint/2015/10/main"/>
 </file>
 
 <file path=ppt/handoutMasters/handoutMaster1.xml><?xml version="1.0" encoding="utf-8"?>
@@ -4736,13 +4732,8 @@
             <a:pPr lvl="1"/>
             <a:r>
               <a:rPr lang="en-US" dirty="0"/>
-              <a:t>L1,L2 </a:t>
-            </a:r>
-            <a:r>
-              <a:rPr lang="en-US" dirty="0" err="1"/>
-              <a:t>Regularizers</a:t>
-            </a:r>
-            <a:endParaRPr lang="en-US" dirty="0"/>
+              <a:t>L1,L2 Regularizers</a:t>
+            </a:r>
           </a:p>
           <a:p>
             <a:pPr lvl="1"/>
@@ -4801,6 +4792,11 @@
           <a:prstGeom prst="rect">
             <a:avLst/>
           </a:prstGeom>
+          <a:ln w="38100">
+            <a:solidFill>
+              <a:srgbClr val="FF0000"/>
+            </a:solidFill>
+          </a:ln>
         </p:spPr>
       </p:pic>
     </p:spTree>
@@ -4925,6 +4921,13 @@
             <a:r>
               <a:rPr lang="en-US" dirty="0"/>
               <a:t>Normal Sampling vs Oversampling</a:t>
+            </a:r>
+          </a:p>
+          <a:p>
+            <a:pPr lvl="1"/>
+            <a:r>
+              <a:rPr lang="en-US" dirty="0"/>
+              <a:t>Using 3 times the training data</a:t>
             </a:r>
           </a:p>
         </p:txBody>
@@ -5192,15 +5195,7 @@
           <a:p>
             <a:r>
               <a:rPr lang="en-US" dirty="0"/>
-              <a:t>Results </a:t>
-            </a:r>
-            <a:r>
-              <a:rPr lang="en-US" dirty="0" err="1"/>
-              <a:t>Cont</a:t>
-            </a:r>
-            <a:r>
-              <a:rPr lang="en-US" dirty="0"/>
-              <a:t>…</a:t>
+              <a:t>Results Cont…</a:t>
             </a:r>
           </a:p>
         </p:txBody>
@@ -5278,33 +5273,87 @@
           </a:p>
         </p:txBody>
       </p:sp>
-      <p:sp>
-        <p:nvSpPr>
-          <p:cNvPr id="4" name="Content Placeholder 3">
+      <p:pic>
+        <p:nvPicPr>
+          <p:cNvPr id="6" name="Content Placeholder 5">
             <a:extLst>
               <a:ext uri="{FF2B5EF4-FFF2-40B4-BE49-F238E27FC236}">
-                <a16:creationId xmlns:a16="http://schemas.microsoft.com/office/drawing/2014/main" id="{4676A552-3329-476C-8DE1-6F0D3175868A}"/>
+                <a16:creationId xmlns:a16="http://schemas.microsoft.com/office/drawing/2014/main" id="{E3C0A338-F327-4A0D-9C89-8D4172D37F7A}"/>
               </a:ext>
             </a:extLst>
           </p:cNvPr>
-          <p:cNvSpPr>
-            <a:spLocks noGrp="1"/>
-          </p:cNvSpPr>
+          <p:cNvPicPr>
+            <a:picLocks noGrp="1" noChangeAspect="1"/>
+          </p:cNvPicPr>
           <p:nvPr>
             <p:ph sz="half" idx="2"/>
           </p:nvPr>
-        </p:nvSpPr>
-        <p:spPr/>
-        <p:txBody>
-          <a:bodyPr>
-            <a:normAutofit fontScale="92500" lnSpcReduction="10000"/>
-          </a:bodyPr>
-          <a:lstStyle/>
-          <a:p>
-            <a:endParaRPr lang="en-US" dirty="0"/>
-          </a:p>
-        </p:txBody>
-      </p:sp>
+        </p:nvPicPr>
+        <p:blipFill>
+          <a:blip r:embed="rId2">
+            <a:extLst>
+              <a:ext uri="{28A0092B-C50C-407E-A947-70E740481C1C}">
+                <a14:useLocalDpi xmlns:a14="http://schemas.microsoft.com/office/drawing/2010/main" val="0"/>
+              </a:ext>
+            </a:extLst>
+          </a:blip>
+          <a:stretch>
+            <a:fillRect/>
+          </a:stretch>
+        </p:blipFill>
+        <p:spPr>
+          <a:xfrm>
+            <a:off x="6932612" y="351531"/>
+            <a:ext cx="3962401" cy="3001269"/>
+          </a:xfrm>
+          <a:ln w="38100">
+            <a:solidFill>
+              <a:srgbClr val="FF0000"/>
+            </a:solidFill>
+          </a:ln>
+        </p:spPr>
+      </p:pic>
+      <p:pic>
+        <p:nvPicPr>
+          <p:cNvPr id="8" name="Picture 7">
+            <a:extLst>
+              <a:ext uri="{FF2B5EF4-FFF2-40B4-BE49-F238E27FC236}">
+                <a16:creationId xmlns:a16="http://schemas.microsoft.com/office/drawing/2014/main" id="{1FC69A1F-B222-4BB6-8EA3-B4A7FE169944}"/>
+              </a:ext>
+            </a:extLst>
+          </p:cNvPr>
+          <p:cNvPicPr>
+            <a:picLocks noChangeAspect="1"/>
+          </p:cNvPicPr>
+          <p:nvPr/>
+        </p:nvPicPr>
+        <p:blipFill>
+          <a:blip r:embed="rId3">
+            <a:extLst>
+              <a:ext uri="{28A0092B-C50C-407E-A947-70E740481C1C}">
+                <a14:useLocalDpi xmlns:a14="http://schemas.microsoft.com/office/drawing/2010/main" val="0"/>
+              </a:ext>
+            </a:extLst>
+          </a:blip>
+          <a:stretch>
+            <a:fillRect/>
+          </a:stretch>
+        </p:blipFill>
+        <p:spPr>
+          <a:xfrm>
+            <a:off x="6932612" y="3505200"/>
+            <a:ext cx="3962400" cy="3014287"/>
+          </a:xfrm>
+          <a:prstGeom prst="rect">
+            <a:avLst/>
+          </a:prstGeom>
+          <a:ln w="38100">
+            <a:solidFill>
+              <a:srgbClr val="FF0000"/>
+            </a:solidFill>
+          </a:ln>
+        </p:spPr>
+      </p:pic>
     </p:spTree>
     <p:extLst>
       <p:ext uri="{BB962C8B-B14F-4D97-AF65-F5344CB8AC3E}">
@@ -5542,7 +5591,9 @@
         </p:nvSpPr>
         <p:spPr/>
         <p:txBody>
-          <a:bodyPr/>
+          <a:bodyPr>
+            <a:normAutofit fontScale="62500" lnSpcReduction="20000"/>
+          </a:bodyPr>
           <a:lstStyle/>
           <a:p>
             <a:r>
@@ -5565,6 +5616,13 @@
             </a:r>
           </a:p>
           <a:p>
+            <a:pPr lvl="2"/>
+            <a:r>
+              <a:rPr lang="en-US" dirty="0"/>
+              <a:t>Filters are window/kernel sizes (it will form a numerical representation over n number of words, characters, etc.)</a:t>
+            </a:r>
+          </a:p>
+          <a:p>
             <a:pPr lvl="1"/>
             <a:r>
               <a:rPr lang="en-US" dirty="0"/>
@@ -5574,7 +5632,32 @@
           <a:p>
             <a:r>
               <a:rPr lang="en-US" dirty="0"/>
+              <a:t>Change Activation Methods</a:t>
+            </a:r>
+          </a:p>
+          <a:p>
+            <a:r>
+              <a:rPr lang="en-US" dirty="0"/>
+              <a:t>Change Loss Metric</a:t>
+            </a:r>
+          </a:p>
+          <a:p>
+            <a:r>
+              <a:rPr lang="en-US" dirty="0"/>
+              <a:t>Adjust Learning Rate</a:t>
+            </a:r>
+          </a:p>
+          <a:p>
+            <a:r>
+              <a:rPr lang="en-US" dirty="0"/>
               <a:t>Mess Around with Punctuation</a:t>
+            </a:r>
+          </a:p>
+          <a:p>
+            <a:pPr lvl="1"/>
+            <a:r>
+              <a:rPr lang="en-US" dirty="0"/>
+              <a:t>Use punctuation as individual “words”</a:t>
             </a:r>
           </a:p>
           <a:p>

</xml_diff>